<commit_message>
Finalized version of 9/12/21 Slidedeck
</commit_message>
<xml_diff>
--- a/slide_decks/cohort_20210912.pptx
+++ b/slide_decks/cohort_20210912.pptx
@@ -702,7 +702,7 @@
                 <a:latin typeface="Courier New" panose="02070309020205020404" pitchFamily="49" charset="0"/>
                 <a:cs typeface="Courier New" panose="02070309020205020404" pitchFamily="49" charset="0"/>
               </a:rPr>
-              <a:t>/</a:t>
+              <a:t>cat /</a:t>
             </a:r>
             <a:r>
               <a:rPr lang="en-US" sz="2000" dirty="0" err="1">
@@ -756,7 +756,7 @@
                 <a:latin typeface="Courier New" panose="02070309020205020404" pitchFamily="49" charset="0"/>
                 <a:cs typeface="Courier New" panose="02070309020205020404" pitchFamily="49" charset="0"/>
               </a:rPr>
-              <a:t>/</a:t>
+              <a:t>cat /</a:t>
             </a:r>
             <a:r>
               <a:rPr lang="en-US" sz="2000" dirty="0" err="1">
@@ -800,7 +800,7 @@
                 <a:latin typeface="Courier New" panose="02070309020205020404" pitchFamily="49" charset="0"/>
                 <a:cs typeface="Courier New" panose="02070309020205020404" pitchFamily="49" charset="0"/>
               </a:rPr>
-              <a:t>/</a:t>
+              <a:t>cat /</a:t>
             </a:r>
             <a:r>
               <a:rPr lang="en-US" sz="2000" dirty="0" err="1">
@@ -1101,16 +1101,37 @@
           </a:p>
           <a:p>
             <a:r>
-              <a:rPr lang="en-US" sz="2000" dirty="0" err="1">
+              <a:rPr lang="en-US" sz="1800" dirty="0" err="1">
+                <a:effectLst/>
                 <a:latin typeface="Courier New" panose="02070309020205020404" pitchFamily="49" charset="0"/>
-                <a:cs typeface="Courier New" panose="02070309020205020404" pitchFamily="49" charset="0"/>
+                <a:ea typeface="Calibri" panose="020F0502020204030204" pitchFamily="34" charset="0"/>
               </a:rPr>
               <a:t>nmtui</a:t>
             </a:r>
-            <a:endParaRPr lang="en-US" sz="2000" dirty="0">
-              <a:latin typeface="Courier New" panose="02070309020205020404" pitchFamily="49" charset="0"/>
-              <a:cs typeface="Courier New" panose="02070309020205020404" pitchFamily="49" charset="0"/>
-            </a:endParaRPr>
+            <a:r>
+              <a:rPr lang="en-US" sz="1800" dirty="0">
+                <a:effectLst/>
+                <a:latin typeface="Courier New" panose="02070309020205020404" pitchFamily="49" charset="0"/>
+                <a:ea typeface="Calibri" panose="020F0502020204030204" pitchFamily="34" charset="0"/>
+              </a:rPr>
+              <a:t>  #graphical terminal utility to configure network </a:t>
+            </a:r>
+            <a:r>
+              <a:rPr lang="en-US" sz="1800" dirty="0" err="1">
+                <a:effectLst/>
+                <a:latin typeface="Courier New" panose="02070309020205020404" pitchFamily="49" charset="0"/>
+                <a:ea typeface="Calibri" panose="020F0502020204030204" pitchFamily="34" charset="0"/>
+              </a:rPr>
+              <a:t>interfaces</a:t>
+            </a:r>
+            <a:r>
+              <a:rPr lang="en-US" sz="3200" dirty="0" err="1"/>
+              <a:t>nmcli</a:t>
+            </a:r>
+            <a:r>
+              <a:rPr lang="en-US" sz="3200" dirty="0"/>
+              <a:t> device  #Display network devices </a:t>
+            </a:r>
           </a:p>
           <a:p>
             <a:pPr marL="0" marR="0" lvl="0" indent="0" algn="l" defTabSz="914400" rtl="0" eaLnBrk="1" fontAlgn="auto" latinLnBrk="0" hangingPunct="1">
@@ -1136,7 +1157,7 @@
             </a:r>
             <a:r>
               <a:rPr lang="en-US" sz="3200" dirty="0"/>
-              <a:t> device  #Display network devices </a:t>
+              <a:t> device show eth0  #Show information about eth0 device </a:t>
             </a:r>
           </a:p>
           <a:p>
@@ -1163,174 +1184,260 @@
             </a:r>
             <a:r>
               <a:rPr lang="en-US" sz="3200" dirty="0"/>
-              <a:t> device show eth0  #Show information about eth0 device </a:t>
-            </a:r>
-          </a:p>
-          <a:p>
-            <a:pPr marL="0" marR="0" lvl="0" indent="0" algn="l" defTabSz="914400" rtl="0" eaLnBrk="1" fontAlgn="auto" latinLnBrk="0" hangingPunct="1">
-              <a:lnSpc>
-                <a:spcPct val="100000"/>
-              </a:lnSpc>
+              <a:t> connection  #Show network connections </a:t>
+            </a:r>
+          </a:p>
+          <a:p>
+            <a:endParaRPr lang="en-US" sz="2000" b="1" dirty="0">
+              <a:latin typeface="+mn-lt"/>
+            </a:endParaRPr>
+          </a:p>
+          <a:p>
+            <a:r>
+              <a:rPr lang="en-US" sz="2000" b="1" dirty="0">
+                <a:latin typeface="+mn-lt"/>
+              </a:rPr>
+              <a:t>• Establishing connectivity</a:t>
+            </a:r>
+          </a:p>
+          <a:p>
+            <a:pPr marL="0" marR="0">
               <a:spcBef>
                 <a:spcPts val="0"/>
               </a:spcBef>
               <a:spcAft>
                 <a:spcPts val="0"/>
               </a:spcAft>
-              <a:buClrTx/>
-              <a:buSzTx/>
-              <a:buFontTx/>
-              <a:buNone/>
-              <a:tabLst/>
-              <a:defRPr/>
             </a:pPr>
             <a:r>
-              <a:rPr lang="en-US" sz="3200" dirty="0" err="1"/>
-              <a:t>nmcli</a:t>
-            </a:r>
-            <a:r>
-              <a:rPr lang="en-US" sz="3200" dirty="0"/>
-              <a:t> connection  #Show network connections </a:t>
-            </a:r>
-          </a:p>
-          <a:p>
-            <a:endParaRPr lang="en-US" sz="2000" b="1" dirty="0">
-              <a:latin typeface="+mn-lt"/>
+              <a:rPr lang="en-US" sz="1800" dirty="0">
+                <a:effectLst/>
+                <a:latin typeface="Courier New" panose="02070309020205020404" pitchFamily="49" charset="0"/>
+                <a:ea typeface="Calibri" panose="020F0502020204030204" pitchFamily="34" charset="0"/>
+                <a:cs typeface="Times New Roman" panose="02020603050405020304" pitchFamily="18" charset="0"/>
+              </a:rPr>
+              <a:t>ping –c1 &lt;</a:t>
+            </a:r>
+            <a:r>
+              <a:rPr lang="en-US" sz="1800" dirty="0" err="1">
+                <a:effectLst/>
+                <a:latin typeface="Courier New" panose="02070309020205020404" pitchFamily="49" charset="0"/>
+                <a:ea typeface="Calibri" panose="020F0502020204030204" pitchFamily="34" charset="0"/>
+                <a:cs typeface="Times New Roman" panose="02020603050405020304" pitchFamily="18" charset="0"/>
+              </a:rPr>
+              <a:t>ip_addr</a:t>
+            </a:r>
+            <a:r>
+              <a:rPr lang="en-US" sz="1800" dirty="0">
+                <a:effectLst/>
+                <a:latin typeface="Courier New" panose="02070309020205020404" pitchFamily="49" charset="0"/>
+                <a:ea typeface="Calibri" panose="020F0502020204030204" pitchFamily="34" charset="0"/>
+                <a:cs typeface="Times New Roman" panose="02020603050405020304" pitchFamily="18" charset="0"/>
+              </a:rPr>
+              <a:t>&gt; #sends a single ping packet to establish connectivity</a:t>
+            </a:r>
+            <a:endParaRPr lang="en-US" sz="1800" dirty="0">
+              <a:effectLst/>
+              <a:latin typeface="Calibri" panose="020F0502020204030204" pitchFamily="34" charset="0"/>
+              <a:ea typeface="Calibri" panose="020F0502020204030204" pitchFamily="34" charset="0"/>
+              <a:cs typeface="Times New Roman" panose="02020603050405020304" pitchFamily="18" charset="0"/>
             </a:endParaRPr>
           </a:p>
           <a:p>
-            <a:r>
-              <a:rPr lang="en-US" sz="2000" b="1" dirty="0">
-                <a:latin typeface="+mn-lt"/>
-              </a:rPr>
-              <a:t>• Establishing connectivity</a:t>
-            </a:r>
-          </a:p>
-          <a:p>
-            <a:pPr marL="0" marR="0" lvl="0" indent="0" algn="l" defTabSz="914400" rtl="0" eaLnBrk="1" fontAlgn="auto" latinLnBrk="0" hangingPunct="1">
-              <a:lnSpc>
-                <a:spcPct val="100000"/>
-              </a:lnSpc>
+            <a:pPr marL="0" marR="0">
               <a:spcBef>
                 <a:spcPts val="0"/>
               </a:spcBef>
               <a:spcAft>
                 <a:spcPts val="0"/>
               </a:spcAft>
-              <a:buClrTx/>
-              <a:buSzTx/>
-              <a:buFontTx/>
-              <a:buNone/>
-              <a:tabLst/>
-              <a:defRPr/>
             </a:pPr>
             <a:r>
-              <a:rPr lang="en-US" sz="2000" dirty="0">
-                <a:latin typeface="+mn-lt"/>
+              <a:rPr lang="en-US" sz="1800" dirty="0">
+                <a:effectLst/>
+                <a:latin typeface="Courier New" panose="02070309020205020404" pitchFamily="49" charset="0"/>
+                <a:ea typeface="Calibri" panose="020F0502020204030204" pitchFamily="34" charset="0"/>
+                <a:cs typeface="Times New Roman" panose="02020603050405020304" pitchFamily="18" charset="0"/>
               </a:rPr>
-              <a:t>ping –c2 127.0.0.1 == ping –c2 192.168.171.128 == ping –c2 localhost</a:t>
-            </a:r>
-          </a:p>
-          <a:p>
-            <a:pPr marL="0" marR="0" lvl="0" indent="0" algn="l" defTabSz="914400" rtl="0" eaLnBrk="1" fontAlgn="auto" latinLnBrk="0" hangingPunct="1">
-              <a:lnSpc>
-                <a:spcPct val="100000"/>
-              </a:lnSpc>
+              <a:t>ping –c2 127.0.0.1 == ping –c2 192.168.171.128 == ping –c2 localhost  #check the local </a:t>
+            </a:r>
+            <a:r>
+              <a:rPr lang="en-US" sz="1800" dirty="0" err="1">
+                <a:effectLst/>
+                <a:latin typeface="Courier New" panose="02070309020205020404" pitchFamily="49" charset="0"/>
+                <a:ea typeface="Calibri" panose="020F0502020204030204" pitchFamily="34" charset="0"/>
+                <a:cs typeface="Times New Roman" panose="02020603050405020304" pitchFamily="18" charset="0"/>
+              </a:rPr>
+              <a:t>tcp</a:t>
+            </a:r>
+            <a:r>
+              <a:rPr lang="en-US" sz="1800" dirty="0">
+                <a:effectLst/>
+                <a:latin typeface="Courier New" panose="02070309020205020404" pitchFamily="49" charset="0"/>
+                <a:ea typeface="Calibri" panose="020F0502020204030204" pitchFamily="34" charset="0"/>
+                <a:cs typeface="Times New Roman" panose="02020603050405020304" pitchFamily="18" charset="0"/>
+              </a:rPr>
+              <a:t>/</a:t>
+            </a:r>
+            <a:r>
+              <a:rPr lang="en-US" sz="1800" dirty="0" err="1">
+                <a:effectLst/>
+                <a:latin typeface="Courier New" panose="02070309020205020404" pitchFamily="49" charset="0"/>
+                <a:ea typeface="Calibri" panose="020F0502020204030204" pitchFamily="34" charset="0"/>
+                <a:cs typeface="Times New Roman" panose="02020603050405020304" pitchFamily="18" charset="0"/>
+              </a:rPr>
+              <a:t>ip</a:t>
+            </a:r>
+            <a:r>
+              <a:rPr lang="en-US" sz="1800" dirty="0">
+                <a:effectLst/>
+                <a:latin typeface="Courier New" panose="02070309020205020404" pitchFamily="49" charset="0"/>
+                <a:ea typeface="Calibri" panose="020F0502020204030204" pitchFamily="34" charset="0"/>
+                <a:cs typeface="Times New Roman" panose="02020603050405020304" pitchFamily="18" charset="0"/>
+              </a:rPr>
+              <a:t> stack</a:t>
+            </a:r>
+            <a:endParaRPr lang="en-US" sz="1800" dirty="0">
+              <a:effectLst/>
+              <a:latin typeface="Calibri" panose="020F0502020204030204" pitchFamily="34" charset="0"/>
+              <a:ea typeface="Calibri" panose="020F0502020204030204" pitchFamily="34" charset="0"/>
+              <a:cs typeface="Times New Roman" panose="02020603050405020304" pitchFamily="18" charset="0"/>
+            </a:endParaRPr>
+          </a:p>
+          <a:p>
+            <a:pPr marL="0" marR="0">
               <a:spcBef>
                 <a:spcPts val="0"/>
               </a:spcBef>
               <a:spcAft>
                 <a:spcPts val="0"/>
               </a:spcAft>
-              <a:buClrTx/>
-              <a:buSzTx/>
-              <a:buFontTx/>
-              <a:buNone/>
-              <a:tabLst/>
-              <a:defRPr/>
             </a:pPr>
             <a:r>
-              <a:rPr lang="en-US" sz="2000" dirty="0">
-                <a:latin typeface="+mn-lt"/>
+              <a:rPr lang="en-US" sz="1800" dirty="0">
+                <a:effectLst/>
+                <a:latin typeface="Courier New" panose="02070309020205020404" pitchFamily="49" charset="0"/>
+                <a:ea typeface="Calibri" panose="020F0502020204030204" pitchFamily="34" charset="0"/>
+                <a:cs typeface="Times New Roman" panose="02020603050405020304" pitchFamily="18" charset="0"/>
               </a:rPr>
-              <a:t>ping –c2 192.168.171.1</a:t>
-            </a:r>
-          </a:p>
-          <a:p>
-            <a:pPr marL="0" marR="0" lvl="0" indent="0" algn="l" defTabSz="914400" rtl="0" eaLnBrk="1" fontAlgn="auto" latinLnBrk="0" hangingPunct="1">
-              <a:lnSpc>
-                <a:spcPct val="100000"/>
-              </a:lnSpc>
+              <a:t>ping –c2 192.168.171.1  #check connectivity to the local router or default gateway</a:t>
+            </a:r>
+            <a:endParaRPr lang="en-US" sz="1800" dirty="0">
+              <a:effectLst/>
+              <a:latin typeface="Calibri" panose="020F0502020204030204" pitchFamily="34" charset="0"/>
+              <a:ea typeface="Calibri" panose="020F0502020204030204" pitchFamily="34" charset="0"/>
+              <a:cs typeface="Times New Roman" panose="02020603050405020304" pitchFamily="18" charset="0"/>
+            </a:endParaRPr>
+          </a:p>
+          <a:p>
+            <a:pPr marL="0" marR="0">
               <a:spcBef>
                 <a:spcPts val="0"/>
               </a:spcBef>
               <a:spcAft>
                 <a:spcPts val="0"/>
               </a:spcAft>
-              <a:buClrTx/>
-              <a:buSzTx/>
-              <a:buFontTx/>
-              <a:buNone/>
-              <a:tabLst/>
-              <a:defRPr/>
             </a:pPr>
             <a:r>
-              <a:rPr lang="en-US" sz="2000" dirty="0">
-                <a:latin typeface="+mn-lt"/>
+              <a:rPr lang="en-US" sz="1800" dirty="0">
+                <a:effectLst/>
+                <a:latin typeface="Courier New" panose="02070309020205020404" pitchFamily="49" charset="0"/>
+                <a:ea typeface="Calibri" panose="020F0502020204030204" pitchFamily="34" charset="0"/>
+                <a:cs typeface="Times New Roman" panose="02020603050405020304" pitchFamily="18" charset="0"/>
               </a:rPr>
-              <a:t>ping –c2 1.1.1.1 </a:t>
-            </a:r>
-          </a:p>
-          <a:p>
-            <a:pPr marL="0" marR="0" lvl="0" indent="0" algn="l" defTabSz="914400" rtl="0" eaLnBrk="1" fontAlgn="auto" latinLnBrk="0" hangingPunct="1">
-              <a:lnSpc>
-                <a:spcPct val="100000"/>
-              </a:lnSpc>
+              <a:t>ping –c2 1.1.1.1  #check connectivity to a </a:t>
+            </a:r>
+            <a:r>
+              <a:rPr lang="en-US" sz="1800" dirty="0" err="1">
+                <a:effectLst/>
+                <a:latin typeface="Courier New" panose="02070309020205020404" pitchFamily="49" charset="0"/>
+                <a:ea typeface="Calibri" panose="020F0502020204030204" pitchFamily="34" charset="0"/>
+                <a:cs typeface="Times New Roman" panose="02020603050405020304" pitchFamily="18" charset="0"/>
+              </a:rPr>
+              <a:t>dns</a:t>
+            </a:r>
+            <a:r>
+              <a:rPr lang="en-US" sz="1800" dirty="0">
+                <a:effectLst/>
+                <a:latin typeface="Courier New" panose="02070309020205020404" pitchFamily="49" charset="0"/>
+                <a:ea typeface="Calibri" panose="020F0502020204030204" pitchFamily="34" charset="0"/>
+                <a:cs typeface="Times New Roman" panose="02020603050405020304" pitchFamily="18" charset="0"/>
+              </a:rPr>
+              <a:t> server on the </a:t>
+            </a:r>
+            <a:r>
+              <a:rPr lang="en-US" sz="1800" dirty="0" err="1">
+                <a:effectLst/>
+                <a:latin typeface="Courier New" panose="02070309020205020404" pitchFamily="49" charset="0"/>
+                <a:ea typeface="Calibri" panose="020F0502020204030204" pitchFamily="34" charset="0"/>
+                <a:cs typeface="Times New Roman" panose="02020603050405020304" pitchFamily="18" charset="0"/>
+              </a:rPr>
+              <a:t>Itnernet</a:t>
+            </a:r>
+            <a:r>
+              <a:rPr lang="en-US" sz="1800" dirty="0">
+                <a:effectLst/>
+                <a:latin typeface="Courier New" panose="02070309020205020404" pitchFamily="49" charset="0"/>
+                <a:ea typeface="Calibri" panose="020F0502020204030204" pitchFamily="34" charset="0"/>
+                <a:cs typeface="Times New Roman" panose="02020603050405020304" pitchFamily="18" charset="0"/>
+              </a:rPr>
+              <a:t> </a:t>
+            </a:r>
+            <a:endParaRPr lang="en-US" sz="1800" dirty="0">
+              <a:effectLst/>
+              <a:latin typeface="Calibri" panose="020F0502020204030204" pitchFamily="34" charset="0"/>
+              <a:ea typeface="Calibri" panose="020F0502020204030204" pitchFamily="34" charset="0"/>
+              <a:cs typeface="Times New Roman" panose="02020603050405020304" pitchFamily="18" charset="0"/>
+            </a:endParaRPr>
+          </a:p>
+          <a:p>
+            <a:pPr marL="0" marR="0">
               <a:spcBef>
                 <a:spcPts val="0"/>
               </a:spcBef>
               <a:spcAft>
                 <a:spcPts val="0"/>
               </a:spcAft>
-              <a:buClrTx/>
-              <a:buSzTx/>
-              <a:buFontTx/>
-              <a:buNone/>
-              <a:tabLst/>
-              <a:defRPr/>
             </a:pPr>
             <a:r>
-              <a:rPr lang="en-US" sz="3200" dirty="0"/>
-              <a:t>ping6 google.com</a:t>
-            </a:r>
-            <a:endParaRPr lang="en-US" sz="2000" dirty="0">
-              <a:latin typeface="+mn-lt"/>
+              <a:rPr lang="en-US" sz="1800" dirty="0">
+                <a:effectLst/>
+                <a:latin typeface="Courier New" panose="02070309020205020404" pitchFamily="49" charset="0"/>
+                <a:ea typeface="Calibri" panose="020F0502020204030204" pitchFamily="34" charset="0"/>
+                <a:cs typeface="Times New Roman" panose="02020603050405020304" pitchFamily="18" charset="0"/>
+              </a:rPr>
+              <a:t>ping6 google.com  #ipv6 version of ping</a:t>
+            </a:r>
+            <a:endParaRPr lang="en-US" sz="1800" dirty="0">
+              <a:effectLst/>
+              <a:latin typeface="Calibri" panose="020F0502020204030204" pitchFamily="34" charset="0"/>
+              <a:ea typeface="Calibri" panose="020F0502020204030204" pitchFamily="34" charset="0"/>
+              <a:cs typeface="Times New Roman" panose="02020603050405020304" pitchFamily="18" charset="0"/>
             </a:endParaRPr>
           </a:p>
           <a:p>
-            <a:pPr marL="0" marR="0" lvl="0" indent="0" algn="l" defTabSz="914400" rtl="0" eaLnBrk="1" fontAlgn="auto" latinLnBrk="0" hangingPunct="1">
-              <a:lnSpc>
-                <a:spcPct val="100000"/>
-              </a:lnSpc>
+            <a:pPr marL="0" marR="0">
               <a:spcBef>
                 <a:spcPts val="0"/>
               </a:spcBef>
               <a:spcAft>
                 <a:spcPts val="0"/>
               </a:spcAft>
-              <a:buClrTx/>
-              <a:buSzTx/>
-              <a:buFontTx/>
-              <a:buNone/>
-              <a:tabLst/>
-              <a:defRPr/>
             </a:pPr>
             <a:r>
-              <a:rPr lang="en-US" sz="3200" dirty="0"/>
-              <a:t>traceroute 8.8.8.8</a:t>
-            </a:r>
-            <a:endParaRPr lang="en-US" sz="2000" b="1" dirty="0">
-              <a:latin typeface="+mn-lt"/>
+              <a:rPr lang="en-US" sz="1800" dirty="0">
+                <a:effectLst/>
+                <a:latin typeface="Courier New" panose="02070309020205020404" pitchFamily="49" charset="0"/>
+                <a:ea typeface="Calibri" panose="020F0502020204030204" pitchFamily="34" charset="0"/>
+                <a:cs typeface="Times New Roman" panose="02020603050405020304" pitchFamily="18" charset="0"/>
+              </a:rPr>
+              <a:t>traceroute 8.8.8.8  #check connectivity between 2 hosts</a:t>
+            </a:r>
+            <a:endParaRPr lang="en-US" sz="1800" dirty="0">
+              <a:effectLst/>
+              <a:latin typeface="Calibri" panose="020F0502020204030204" pitchFamily="34" charset="0"/>
+              <a:ea typeface="Calibri" panose="020F0502020204030204" pitchFamily="34" charset="0"/>
+              <a:cs typeface="Times New Roman" panose="02020603050405020304" pitchFamily="18" charset="0"/>
             </a:endParaRPr>
           </a:p>
           <a:p>
@@ -1349,60 +1456,166 @@
             </a:r>
           </a:p>
           <a:p>
-            <a:r>
-              <a:rPr lang="en-US" sz="2000" dirty="0">
+            <a:pPr marL="0" marR="0">
+              <a:spcBef>
+                <a:spcPts val="0"/>
+              </a:spcBef>
+              <a:spcAft>
+                <a:spcPts val="0"/>
+              </a:spcAft>
+            </a:pPr>
+            <a:r>
+              <a:rPr lang="en-US" sz="1800" dirty="0">
+                <a:effectLst/>
                 <a:latin typeface="Courier New" panose="02070309020205020404" pitchFamily="49" charset="0"/>
-                <a:cs typeface="Courier New" panose="02070309020205020404" pitchFamily="49" charset="0"/>
+                <a:ea typeface="Calibri" panose="020F0502020204030204" pitchFamily="34" charset="0"/>
+                <a:cs typeface="Times New Roman" panose="02020603050405020304" pitchFamily="18" charset="0"/>
               </a:rPr>
-              <a:t>netstat</a:t>
-            </a:r>
-          </a:p>
-          <a:p>
-            <a:r>
-              <a:rPr lang="en-US" sz="2000" dirty="0">
+              <a:t>netstat -ant  #shows socket statistics</a:t>
+            </a:r>
+            <a:endParaRPr lang="en-US" sz="1800" dirty="0">
+              <a:effectLst/>
+              <a:latin typeface="Calibri" panose="020F0502020204030204" pitchFamily="34" charset="0"/>
+              <a:ea typeface="Calibri" panose="020F0502020204030204" pitchFamily="34" charset="0"/>
+              <a:cs typeface="Times New Roman" panose="02020603050405020304" pitchFamily="18" charset="0"/>
+            </a:endParaRPr>
+          </a:p>
+          <a:p>
+            <a:pPr marL="0" marR="0">
+              <a:spcBef>
+                <a:spcPts val="0"/>
+              </a:spcBef>
+              <a:spcAft>
+                <a:spcPts val="0"/>
+              </a:spcAft>
+            </a:pPr>
+            <a:r>
+              <a:rPr lang="en-US" sz="1800" dirty="0">
+                <a:effectLst/>
                 <a:latin typeface="Courier New" panose="02070309020205020404" pitchFamily="49" charset="0"/>
-                <a:cs typeface="Courier New" panose="02070309020205020404" pitchFamily="49" charset="0"/>
+                <a:ea typeface="Calibri" panose="020F0502020204030204" pitchFamily="34" charset="0"/>
+                <a:cs typeface="Times New Roman" panose="02020603050405020304" pitchFamily="18" charset="0"/>
               </a:rPr>
-              <a:t>ss</a:t>
-            </a:r>
-          </a:p>
-          <a:p>
-            <a:r>
-              <a:rPr lang="en-US" sz="3200" dirty="0"/>
+              <a:t>ss –ant  #shows socket statistics</a:t>
+            </a:r>
+            <a:endParaRPr lang="en-US" sz="1800" dirty="0">
+              <a:effectLst/>
+              <a:latin typeface="Calibri" panose="020F0502020204030204" pitchFamily="34" charset="0"/>
+              <a:ea typeface="Calibri" panose="020F0502020204030204" pitchFamily="34" charset="0"/>
+              <a:cs typeface="Times New Roman" panose="02020603050405020304" pitchFamily="18" charset="0"/>
+            </a:endParaRPr>
+          </a:p>
+          <a:p>
+            <a:pPr marL="0" marR="0">
+              <a:spcBef>
+                <a:spcPts val="0"/>
+              </a:spcBef>
+              <a:spcAft>
+                <a:spcPts val="0"/>
+              </a:spcAft>
+            </a:pPr>
+            <a:r>
+              <a:rPr lang="en-US" sz="1800" dirty="0">
+                <a:effectLst/>
+                <a:latin typeface="Courier New" panose="02070309020205020404" pitchFamily="49" charset="0"/>
+                <a:ea typeface="Calibri" panose="020F0502020204030204" pitchFamily="34" charset="0"/>
+                <a:cs typeface="Times New Roman" panose="02020603050405020304" pitchFamily="18" charset="0"/>
+              </a:rPr>
               <a:t>netstat --listening -l  #List ports in listening mode </a:t>
             </a:r>
-          </a:p>
-          <a:p>
-            <a:r>
-              <a:rPr lang="en-US" sz="3200" dirty="0"/>
+            <a:endParaRPr lang="en-US" sz="1800" dirty="0">
+              <a:effectLst/>
+              <a:latin typeface="Calibri" panose="020F0502020204030204" pitchFamily="34" charset="0"/>
+              <a:ea typeface="Calibri" panose="020F0502020204030204" pitchFamily="34" charset="0"/>
+              <a:cs typeface="Times New Roman" panose="02020603050405020304" pitchFamily="18" charset="0"/>
+            </a:endParaRPr>
+          </a:p>
+          <a:p>
+            <a:pPr marL="0" marR="0">
+              <a:spcBef>
+                <a:spcPts val="0"/>
+              </a:spcBef>
+              <a:spcAft>
+                <a:spcPts val="0"/>
+              </a:spcAft>
+            </a:pPr>
+            <a:r>
+              <a:rPr lang="en-US" sz="1800" dirty="0">
+                <a:effectLst/>
+                <a:latin typeface="Courier New" panose="02070309020205020404" pitchFamily="49" charset="0"/>
+                <a:ea typeface="Calibri" panose="020F0502020204030204" pitchFamily="34" charset="0"/>
+                <a:cs typeface="Times New Roman" panose="02020603050405020304" pitchFamily="18" charset="0"/>
+              </a:rPr>
               <a:t>netstat --all –a  #List all ports </a:t>
             </a:r>
-          </a:p>
-          <a:p>
-            <a:r>
-              <a:rPr lang="en-US" sz="3200" dirty="0"/>
+            <a:endParaRPr lang="en-US" sz="1800" dirty="0">
+              <a:effectLst/>
+              <a:latin typeface="Calibri" panose="020F0502020204030204" pitchFamily="34" charset="0"/>
+              <a:ea typeface="Calibri" panose="020F0502020204030204" pitchFamily="34" charset="0"/>
+              <a:cs typeface="Times New Roman" panose="02020603050405020304" pitchFamily="18" charset="0"/>
+            </a:endParaRPr>
+          </a:p>
+          <a:p>
+            <a:pPr marL="0" marR="0">
+              <a:spcBef>
+                <a:spcPts val="0"/>
+              </a:spcBef>
+              <a:spcAft>
+                <a:spcPts val="0"/>
+              </a:spcAft>
+            </a:pPr>
+            <a:r>
+              <a:rPr lang="en-US" sz="1800" dirty="0">
+                <a:effectLst/>
+                <a:latin typeface="Courier New" panose="02070309020205020404" pitchFamily="49" charset="0"/>
+                <a:ea typeface="Calibri" panose="020F0502020204030204" pitchFamily="34" charset="0"/>
+                <a:cs typeface="Times New Roman" panose="02020603050405020304" pitchFamily="18" charset="0"/>
+              </a:rPr>
               <a:t>netstat --route -r  #Display routing tables </a:t>
             </a:r>
-          </a:p>
-          <a:p>
-            <a:r>
-              <a:rPr lang="en-US" sz="3200" dirty="0"/>
+            <a:endParaRPr lang="en-US" sz="1800" dirty="0">
+              <a:effectLst/>
+              <a:latin typeface="Calibri" panose="020F0502020204030204" pitchFamily="34" charset="0"/>
+              <a:ea typeface="Calibri" panose="020F0502020204030204" pitchFamily="34" charset="0"/>
+              <a:cs typeface="Times New Roman" panose="02020603050405020304" pitchFamily="18" charset="0"/>
+            </a:endParaRPr>
+          </a:p>
+          <a:p>
+            <a:pPr marL="0" marR="0">
+              <a:spcBef>
+                <a:spcPts val="0"/>
+              </a:spcBef>
+              <a:spcAft>
+                <a:spcPts val="0"/>
+              </a:spcAft>
+            </a:pPr>
+            <a:r>
+              <a:rPr lang="en-US" sz="1800" dirty="0">
+                <a:effectLst/>
+                <a:latin typeface="Courier New" panose="02070309020205020404" pitchFamily="49" charset="0"/>
+                <a:ea typeface="Calibri" panose="020F0502020204030204" pitchFamily="34" charset="0"/>
+                <a:cs typeface="Times New Roman" panose="02020603050405020304" pitchFamily="18" charset="0"/>
+              </a:rPr>
               <a:t>netstat --interfaces -</a:t>
             </a:r>
             <a:r>
-              <a:rPr lang="en-US" sz="3200" dirty="0" err="1"/>
+              <a:rPr lang="en-US" sz="1800" dirty="0" err="1">
+                <a:effectLst/>
+                <a:latin typeface="Courier New" panose="02070309020205020404" pitchFamily="49" charset="0"/>
+                <a:ea typeface="Calibri" panose="020F0502020204030204" pitchFamily="34" charset="0"/>
+                <a:cs typeface="Times New Roman" panose="02020603050405020304" pitchFamily="18" charset="0"/>
+              </a:rPr>
               <a:t>i</a:t>
             </a:r>
             <a:r>
-              <a:rPr lang="en-US" sz="3200" dirty="0"/>
+              <a:rPr lang="en-US" sz="1800" dirty="0">
+                <a:effectLst/>
+                <a:latin typeface="Courier New" panose="02070309020205020404" pitchFamily="49" charset="0"/>
+                <a:ea typeface="Calibri" panose="020F0502020204030204" pitchFamily="34" charset="0"/>
+                <a:cs typeface="Times New Roman" panose="02020603050405020304" pitchFamily="18" charset="0"/>
+              </a:rPr>
               <a:t>  #Display TX/RX packet statistics for each interface </a:t>
             </a:r>
-            <a:endParaRPr lang="en-US" sz="2000" dirty="0">
-              <a:latin typeface="Courier New" panose="02070309020205020404" pitchFamily="49" charset="0"/>
-              <a:cs typeface="Courier New" panose="02070309020205020404" pitchFamily="49" charset="0"/>
-            </a:endParaRPr>
-          </a:p>
-          <a:p>
             <a:endParaRPr lang="en-US" sz="2000" dirty="0">
               <a:latin typeface="Courier New" panose="02070309020205020404" pitchFamily="49" charset="0"/>
               <a:cs typeface="Courier New" panose="02070309020205020404" pitchFamily="49" charset="0"/>
@@ -2187,7 +2400,7 @@
               <a:rPr lang="en-US" dirty="0">
                 <a:latin typeface="Calibri" panose="020F0502020204030204" pitchFamily="34" charset="0"/>
               </a:rPr>
-              <a:t>Ifconfig  #shows data for each interface, </a:t>
+              <a:t>ifconfig  #shows data for each interface, </a:t>
             </a:r>
             <a:r>
               <a:rPr lang="en-US" dirty="0" err="1">
@@ -2337,7 +2550,7 @@
               <a:rPr lang="en-US" dirty="0">
                 <a:latin typeface="Calibri" panose="020F0502020204030204" pitchFamily="34" charset="0"/>
               </a:rPr>
-              <a:t>&gt;</a:t>
+              <a:t>&gt;  #sends a single ping packet to establish connectivity</a:t>
             </a:r>
           </a:p>
           <a:p>
@@ -2355,19 +2568,31 @@
               <a:rPr lang="en-US" dirty="0">
                 <a:latin typeface="Calibri" panose="020F0502020204030204" pitchFamily="34" charset="0"/>
               </a:rPr>
-              <a:t>host www.google.com  #shows </a:t>
-            </a:r>
-            <a:r>
-              <a:rPr lang="en-US" dirty="0" err="1">
-                <a:latin typeface="Calibri" panose="020F0502020204030204" pitchFamily="34" charset="0"/>
+              <a:t>host www.google.com  </a:t>
+            </a:r>
+            <a:r>
+              <a:rPr lang="en-US" sz="1800" dirty="0">
+                <a:effectLst/>
+                <a:latin typeface="Courier New" panose="02070309020205020404" pitchFamily="49" charset="0"/>
+                <a:ea typeface="Calibri" panose="020F0502020204030204" pitchFamily="34" charset="0"/>
+              </a:rPr>
+              <a:t>#shows </a:t>
+            </a:r>
+            <a:r>
+              <a:rPr lang="en-US" sz="1800" dirty="0" err="1">
+                <a:effectLst/>
+                <a:latin typeface="Courier New" panose="02070309020205020404" pitchFamily="49" charset="0"/>
+                <a:ea typeface="Calibri" panose="020F0502020204030204" pitchFamily="34" charset="0"/>
               </a:rPr>
               <a:t>dns</a:t>
             </a:r>
             <a:r>
-              <a:rPr lang="en-US" dirty="0">
-                <a:latin typeface="Calibri" panose="020F0502020204030204" pitchFamily="34" charset="0"/>
+              <a:rPr lang="en-US" sz="1800" dirty="0">
+                <a:effectLst/>
+                <a:latin typeface="Courier New" panose="02070309020205020404" pitchFamily="49" charset="0"/>
+                <a:ea typeface="Calibri" panose="020F0502020204030204" pitchFamily="34" charset="0"/>
               </a:rPr>
-              <a:t> info</a:t>
+              <a:t> info and mx records</a:t>
             </a:r>
           </a:p>
           <a:p>
@@ -2382,63 +2607,49 @@
               <a:buNone/>
             </a:pPr>
             <a:r>
-              <a:rPr kumimoji="0" lang="en-US" altLang="en-US" sz="1200" b="0" i="0" u="none" strike="noStrike" cap="none" normalizeH="0" baseline="0" dirty="0" err="1">
-                <a:ln>
-                  <a:noFill/>
-                </a:ln>
-                <a:solidFill>
-                  <a:schemeClr val="tx1"/>
-                </a:solidFill>
+              <a:rPr lang="en-US" sz="1800" dirty="0" err="1">
                 <a:effectLst/>
-                <a:latin typeface="Calibri" panose="020F0502020204030204" pitchFamily="34" charset="0"/>
-                <a:cs typeface="Calibri" panose="020F0502020204030204" pitchFamily="34" charset="0"/>
+                <a:latin typeface="Courier New" panose="02070309020205020404" pitchFamily="49" charset="0"/>
+                <a:ea typeface="Calibri" panose="020F0502020204030204" pitchFamily="34" charset="0"/>
               </a:rPr>
               <a:t>ethtool</a:t>
             </a:r>
             <a:r>
-              <a:rPr kumimoji="0" lang="en-US" altLang="en-US" sz="1200" b="0" i="0" u="none" strike="noStrike" cap="none" normalizeH="0" baseline="0" dirty="0">
-                <a:ln>
-                  <a:noFill/>
-                </a:ln>
-                <a:solidFill>
-                  <a:schemeClr val="tx1"/>
-                </a:solidFill>
+              <a:rPr lang="en-US" sz="1800" dirty="0">
                 <a:effectLst/>
-                <a:latin typeface="Calibri" panose="020F0502020204030204" pitchFamily="34" charset="0"/>
-                <a:cs typeface="Calibri" panose="020F0502020204030204" pitchFamily="34" charset="0"/>
+                <a:latin typeface="Courier New" panose="02070309020205020404" pitchFamily="49" charset="0"/>
+                <a:ea typeface="Calibri" panose="020F0502020204030204" pitchFamily="34" charset="0"/>
               </a:rPr>
               <a:t> &lt;</a:t>
             </a:r>
             <a:r>
-              <a:rPr kumimoji="0" lang="en-US" altLang="en-US" sz="1200" b="0" i="0" u="none" strike="noStrike" cap="none" normalizeH="0" baseline="0" dirty="0" err="1">
-                <a:ln>
-                  <a:noFill/>
-                </a:ln>
-                <a:solidFill>
-                  <a:schemeClr val="tx1"/>
-                </a:solidFill>
+              <a:rPr lang="en-US" sz="1800" dirty="0" err="1">
                 <a:effectLst/>
-                <a:latin typeface="Calibri" panose="020F0502020204030204" pitchFamily="34" charset="0"/>
-                <a:cs typeface="Calibri" panose="020F0502020204030204" pitchFamily="34" charset="0"/>
+                <a:latin typeface="Courier New" panose="02070309020205020404" pitchFamily="49" charset="0"/>
+                <a:ea typeface="Calibri" panose="020F0502020204030204" pitchFamily="34" charset="0"/>
               </a:rPr>
               <a:t>devname</a:t>
             </a:r>
             <a:r>
-              <a:rPr kumimoji="0" lang="en-US" altLang="en-US" sz="1200" b="0" i="0" u="none" strike="noStrike" cap="none" normalizeH="0" baseline="0" dirty="0">
-                <a:ln>
-                  <a:noFill/>
-                </a:ln>
-                <a:solidFill>
-                  <a:schemeClr val="tx1"/>
-                </a:solidFill>
+              <a:rPr lang="en-US" sz="1800" dirty="0">
                 <a:effectLst/>
-                <a:latin typeface="Calibri" panose="020F0502020204030204" pitchFamily="34" charset="0"/>
-                <a:cs typeface="Calibri" panose="020F0502020204030204" pitchFamily="34" charset="0"/>
+                <a:latin typeface="Courier New" panose="02070309020205020404" pitchFamily="49" charset="0"/>
+                <a:ea typeface="Calibri" panose="020F0502020204030204" pitchFamily="34" charset="0"/>
               </a:rPr>
-              <a:t>&gt;</a:t>
-            </a:r>
-          </a:p>
-          <a:p>
+              <a:t>&gt;  #shows NIC parameters</a:t>
+            </a:r>
+          </a:p>
+          <a:p>
+            <a:pPr marL="342900" indent="0" fontAlgn="ctr">
+              <a:spcBef>
+                <a:spcPts val="0"/>
+              </a:spcBef>
+              <a:spcAft>
+                <a:spcPts val="0"/>
+              </a:spcAft>
+              <a:buFont typeface="Arial" panose="020B0604020202020204" pitchFamily="34" charset="0"/>
+              <a:buNone/>
+            </a:pPr>
             <a:endParaRPr lang="en-US" dirty="0"/>
           </a:p>
           <a:p>

</xml_diff>